<commit_message>
Update gin-gonic hot reloading
</commit_message>
<xml_diff>
--- a/Article/GO/gin-gonic_hot_reloading/img/img.pptx
+++ b/Article/GO/gin-gonic_hot_reloading/img/img.pptx
@@ -3834,7 +3834,7 @@
     <p:bg>
       <p:bgPr>
         <a:solidFill>
-          <a:srgbClr val="4489FA"/>
+          <a:srgbClr val="6B6EEF"/>
         </a:solidFill>
         <a:effectLst/>
       </p:bgPr>
@@ -3855,10 +3855,10 @@
       </p:grpSpPr>
       <p:pic>
         <p:nvPicPr>
-          <p:cNvPr id="5" name="그림 4" descr="그리기이(가) 표시된 사진&#10;&#10;자동 생성된 설명">
-            <a:extLst>
-              <a:ext uri="{FF2B5EF4-FFF2-40B4-BE49-F238E27FC236}">
-                <a16:creationId xmlns:a16="http://schemas.microsoft.com/office/drawing/2014/main" id="{949A0750-E4FF-4AB4-89A1-671C88CC9EBD}"/>
+          <p:cNvPr id="7" name="그림 6">
+            <a:extLst>
+              <a:ext uri="{FF2B5EF4-FFF2-40B4-BE49-F238E27FC236}">
+                <a16:creationId xmlns:a16="http://schemas.microsoft.com/office/drawing/2014/main" id="{3871659D-F517-46DF-8F4A-0778102CF263}"/>
               </a:ext>
             </a:extLst>
           </p:cNvPr>
@@ -3880,44 +3880,8 @@
           </a:stretch>
         </p:blipFill>
         <p:spPr>
-          <a:xfrm rot="3435407">
-            <a:off x="5542287" y="1333087"/>
-            <a:ext cx="1431726" cy="1949534"/>
-          </a:xfrm>
-          <a:prstGeom prst="rect">
-            <a:avLst/>
-          </a:prstGeom>
-        </p:spPr>
-      </p:pic>
-      <p:pic>
-        <p:nvPicPr>
-          <p:cNvPr id="7" name="그림 6">
-            <a:extLst>
-              <a:ext uri="{FF2B5EF4-FFF2-40B4-BE49-F238E27FC236}">
-                <a16:creationId xmlns:a16="http://schemas.microsoft.com/office/drawing/2014/main" id="{3871659D-F517-46DF-8F4A-0778102CF263}"/>
-              </a:ext>
-            </a:extLst>
-          </p:cNvPr>
-          <p:cNvPicPr>
-            <a:picLocks noChangeAspect="1"/>
-          </p:cNvPicPr>
-          <p:nvPr/>
-        </p:nvPicPr>
-        <p:blipFill>
-          <a:blip r:embed="rId3">
-            <a:extLst>
-              <a:ext uri="{28A0092B-C50C-407E-A947-70E740481C1C}">
-                <a14:useLocalDpi xmlns:a14="http://schemas.microsoft.com/office/drawing/2010/main" val="0"/>
-              </a:ext>
-            </a:extLst>
-          </a:blip>
-          <a:stretch>
-            <a:fillRect/>
-          </a:stretch>
-        </p:blipFill>
-        <p:spPr>
           <a:xfrm>
-            <a:off x="5228975" y="3033054"/>
+            <a:off x="5228975" y="3375954"/>
             <a:ext cx="1734049" cy="1734049"/>
           </a:xfrm>
           <a:prstGeom prst="rect">
@@ -3940,7 +3904,7 @@
           <p:nvPr/>
         </p:nvPicPr>
         <p:blipFill>
-          <a:blip r:embed="rId4"/>
+          <a:blip r:embed="rId3"/>
           <a:stretch>
             <a:fillRect/>
           </a:stretch>
@@ -3970,7 +3934,7 @@
           <p:nvPr/>
         </p:nvPicPr>
         <p:blipFill>
-          <a:blip r:embed="rId5"/>
+          <a:blip r:embed="rId4"/>
           <a:stretch>
             <a:fillRect/>
           </a:stretch>
@@ -4000,7 +3964,7 @@
           <p:nvPr/>
         </p:nvPicPr>
         <p:blipFill>
-          <a:blip r:embed="rId6"/>
+          <a:blip r:embed="rId5"/>
           <a:stretch>
             <a:fillRect/>
           </a:stretch>
@@ -4030,7 +3994,7 @@
           <p:nvPr/>
         </p:nvPicPr>
         <p:blipFill>
-          <a:blip r:embed="rId7"/>
+          <a:blip r:embed="rId6"/>
           <a:stretch>
             <a:fillRect/>
           </a:stretch>
@@ -4059,14 +4023,14 @@
         </p:nvSpPr>
         <p:spPr>
           <a:xfrm>
-            <a:off x="4152899" y="4512260"/>
+            <a:off x="4152899" y="4826585"/>
             <a:ext cx="3606800" cy="733262"/>
           </a:xfrm>
           <a:prstGeom prst="rect">
             <a:avLst/>
           </a:prstGeom>
           <a:solidFill>
-            <a:srgbClr val="4489FA"/>
+            <a:srgbClr val="6B6EEF"/>
           </a:solidFill>
           <a:ln>
             <a:noFill/>
@@ -4111,7 +4075,7 @@
         </p:nvSpPr>
         <p:spPr>
           <a:xfrm>
-            <a:off x="5643233" y="3767161"/>
+            <a:off x="5643233" y="4110061"/>
             <a:ext cx="228921" cy="265837"/>
           </a:xfrm>
           <a:prstGeom prst="rect">
@@ -4163,8 +4127,8 @@
         </p:nvSpPr>
         <p:spPr>
           <a:xfrm>
-            <a:off x="4726777" y="4594581"/>
-            <a:ext cx="2738446" cy="492443"/>
+            <a:off x="4413136" y="4931606"/>
+            <a:ext cx="3365726" cy="523220"/>
           </a:xfrm>
           <a:prstGeom prst="rect">
             <a:avLst/>
@@ -4179,7 +4143,7 @@
           <a:p>
             <a:pPr algn="ctr"/>
             <a:r>
-              <a:rPr lang="en-US" altLang="ko-KR" sz="2600" b="1">
+              <a:rPr lang="en-US" altLang="ko-KR" sz="2800" b="1">
                 <a:solidFill>
                   <a:schemeClr val="bg1"/>
                 </a:solidFill>
@@ -4188,7 +4152,7 @@
               </a:rPr>
               <a:t>Hot Reloading </a:t>
             </a:r>
-            <a:endParaRPr lang="ko-KR" altLang="en-US" sz="2600" b="1">
+            <a:endParaRPr lang="ko-KR" altLang="en-US" sz="2800" b="1">
               <a:solidFill>
                 <a:schemeClr val="bg1"/>
               </a:solidFill>
@@ -4198,6 +4162,53 @@
           </a:p>
         </p:txBody>
       </p:sp>
+      <p:pic>
+        <p:nvPicPr>
+          <p:cNvPr id="1026" name="Picture 2">
+            <a:extLst>
+              <a:ext uri="{FF2B5EF4-FFF2-40B4-BE49-F238E27FC236}">
+                <a16:creationId xmlns:a16="http://schemas.microsoft.com/office/drawing/2014/main" id="{90272467-9DE3-4DC9-B96E-F7B60E1F385F}"/>
+              </a:ext>
+            </a:extLst>
+          </p:cNvPr>
+          <p:cNvPicPr>
+            <a:picLocks noChangeAspect="1" noChangeArrowheads="1"/>
+          </p:cNvPicPr>
+          <p:nvPr/>
+        </p:nvPicPr>
+        <p:blipFill>
+          <a:blip r:embed="rId7">
+            <a:extLst>
+              <a:ext uri="{28A0092B-C50C-407E-A947-70E740481C1C}">
+                <a14:useLocalDpi xmlns:a14="http://schemas.microsoft.com/office/drawing/2010/main" val="0"/>
+              </a:ext>
+            </a:extLst>
+          </a:blip>
+          <a:srcRect/>
+          <a:stretch>
+            <a:fillRect/>
+          </a:stretch>
+        </p:blipFill>
+        <p:spPr bwMode="auto">
+          <a:xfrm rot="2947939">
+            <a:off x="5096950" y="903110"/>
+            <a:ext cx="1959773" cy="2755034"/>
+          </a:xfrm>
+          <a:prstGeom prst="rect">
+            <a:avLst/>
+          </a:prstGeom>
+          <a:noFill/>
+          <a:extLst>
+            <a:ext uri="{909E8E84-426E-40DD-AFC4-6F175D3DCCD1}">
+              <a14:hiddenFill xmlns:a14="http://schemas.microsoft.com/office/drawing/2010/main">
+                <a:solidFill>
+                  <a:srgbClr val="FFFFFF"/>
+                </a:solidFill>
+              </a14:hiddenFill>
+            </a:ext>
+          </a:extLst>
+        </p:spPr>
+      </p:pic>
     </p:spTree>
     <p:extLst>
       <p:ext uri="{BB962C8B-B14F-4D97-AF65-F5344CB8AC3E}">

</xml_diff>